<commit_message>
add README, supports nol2
</commit_message>
<xml_diff>
--- a/icons/icon.pptx
+++ b/icons/icon.pptx
@@ -104,7 +104,41 @@
       </a:defRPr>
     </a:lvl9pPr>
   </p:defaultTextStyle>
+  <p:extLst>
+    <p:ext uri="{EFAFB233-063F-42B5-8137-9DF3F51BA10A}">
+      <p15:sldGuideLst xmlns:p15="http://schemas.microsoft.com/office/powerpoint/2012/main"/>
+    </p:ext>
+  </p:extLst>
 </p:presentation>
+</file>
+
+<file path=ppt/changesInfos/changesInfo1.xml><?xml version="1.0" encoding="utf-8"?>
+<pc:chgInfo xmlns:a="http://schemas.openxmlformats.org/drawingml/2006/main" xmlns:r="http://schemas.openxmlformats.org/officeDocument/2006/relationships" xmlns:ac="http://schemas.microsoft.com/office/drawing/2013/main/command" xmlns:pc="http://schemas.microsoft.com/office/powerpoint/2013/main/command">
+  <pc:docChgLst>
+    <pc:chgData name="懷元 郭" userId="59d291255284839b" providerId="LiveId" clId="{29CC050B-5AC5-4AE4-8E4E-070851A273EF}"/>
+    <pc:docChg chg="modSld">
+      <pc:chgData name="懷元 郭" userId="59d291255284839b" providerId="LiveId" clId="{29CC050B-5AC5-4AE4-8E4E-070851A273EF}" dt="2022-02-02T09:17:59.711" v="12" actId="1076"/>
+      <pc:docMkLst>
+        <pc:docMk/>
+      </pc:docMkLst>
+      <pc:sldChg chg="modSp mod">
+        <pc:chgData name="懷元 郭" userId="59d291255284839b" providerId="LiveId" clId="{29CC050B-5AC5-4AE4-8E4E-070851A273EF}" dt="2022-02-02T09:17:59.711" v="12" actId="1076"/>
+        <pc:sldMkLst>
+          <pc:docMk/>
+          <pc:sldMk cId="531817254" sldId="256"/>
+        </pc:sldMkLst>
+        <pc:spChg chg="mod">
+          <ac:chgData name="懷元 郭" userId="59d291255284839b" providerId="LiveId" clId="{29CC050B-5AC5-4AE4-8E4E-070851A273EF}" dt="2022-02-02T09:17:59.711" v="12" actId="1076"/>
+          <ac:spMkLst>
+            <pc:docMk/>
+            <pc:sldMk cId="531817254" sldId="256"/>
+            <ac:spMk id="6" creationId="{E609A933-5E57-4DD7-B11A-4E791B13C479}"/>
+          </ac:spMkLst>
+        </pc:spChg>
+      </pc:sldChg>
+    </pc:docChg>
+  </pc:docChgLst>
+</pc:chgInfo>
 </file>
 
 <file path=ppt/slideLayouts/slideLayout1.xml><?xml version="1.0" encoding="utf-8"?>
@@ -3019,8 +3053,8 @@
         </p:nvSpPr>
         <p:spPr>
           <a:xfrm>
-            <a:off x="573395" y="323324"/>
-            <a:ext cx="977549" cy="789887"/>
+            <a:off x="444569" y="267279"/>
+            <a:ext cx="1260459" cy="923330"/>
           </a:xfrm>
           <a:prstGeom prst="rect">
             <a:avLst/>
@@ -3035,7 +3069,7 @@
           <a:p>
             <a:pPr algn="ctr"/>
             <a:r>
-              <a:rPr lang="zh-TW" altLang="en-US" sz="4400" dirty="0">
+              <a:rPr lang="zh-TW" altLang="en-US" sz="5400" dirty="0">
                 <a:latin typeface="Noto Sans TC Medium" panose="020B0600000000000000" pitchFamily="34" charset="-120"/>
                 <a:ea typeface="Noto Sans TC Medium" panose="020B0600000000000000" pitchFamily="34" charset="-120"/>
               </a:rPr>

</xml_diff>